<commit_message>
added extra slide to .ppt
</commit_message>
<xml_diff>
--- a/MinimumViableRiskManagement/Minimum Viable Risk Management.pptx
+++ b/MinimumViableRiskManagement/Minimum Viable Risk Management.pptx
@@ -6,6 +6,7 @@
   </p:sldMasterIdLst>
   <p:sldIdLst>
     <p:sldId id="256" r:id="rId3"/>
+    <p:sldId id="257" r:id="rId4"/>
   </p:sldIdLst>
   <p:sldSz cx="10080625" cy="7559675"/>
   <p:notesSz cx="7772400" cy="10058400"/>
@@ -1946,7 +1947,7 @@
           <a:bodyPr lIns="0" rIns="0" tIns="0" bIns="0"/>
           <a:p>
             <a:pPr algn="r"/>
-            <a:fld id="{6F117319-7BB6-4DA5-9C03-EB342DA760A2}" type="slidenum">
+            <a:fld id="{944C00D0-5647-493F-85E0-0B1175B0BDF3}" type="slidenum">
               <a:rPr b="0" lang="en-US" sz="1400" spc="-1" strike="noStrike">
                 <a:solidFill>
                   <a:srgbClr val="000000"/>
@@ -2034,6 +2035,20 @@
           <a:bodyPr lIns="0" rIns="0" tIns="0" bIns="0" anchor="ctr"/>
           <a:p>
             <a:pPr algn="ctr"/>
+            <a:r>
+              <a:rPr b="0" lang="en-US" sz="4400" spc="-1" strike="noStrike">
+                <a:solidFill>
+                  <a:srgbClr val="000000"/>
+                </a:solidFill>
+                <a:uFill>
+                  <a:solidFill>
+                    <a:srgbClr val="ffffff"/>
+                  </a:solidFill>
+                </a:uFill>
+                <a:latin typeface="Arial"/>
+              </a:rPr>
+              <a:t>Minimum Viable Risk Management</a:t>
+            </a:r>
             <a:endParaRPr b="0" lang="en-US" sz="4400" spc="-1" strike="noStrike">
               <a:solidFill>
                 <a:srgbClr val="000000"/>
@@ -2056,8 +2071,8 @@
         </p:nvSpPr>
         <p:spPr>
           <a:xfrm>
-            <a:off x="504000" y="1769040"/>
-            <a:ext cx="9071640" cy="4384440"/>
+            <a:off x="2881440" y="822960"/>
+            <a:ext cx="4433760" cy="1980000"/>
           </a:xfrm>
           <a:prstGeom prst="rect">
             <a:avLst/>
@@ -2071,22 +2086,163 @@
           <a:bodyPr lIns="0" rIns="0" tIns="0" bIns="0" anchor="ctr"/>
           <a:p>
             <a:pPr algn="ctr"/>
-            <a:endParaRPr b="0" lang="en-US" sz="3200" spc="-1" strike="noStrike">
-              <a:solidFill>
-                <a:srgbClr val="000000"/>
-              </a:solidFill>
-              <a:uFill>
-                <a:solidFill>
-                  <a:srgbClr val="ffffff"/>
-                </a:solidFill>
-              </a:uFill>
-              <a:latin typeface="Arial"/>
-            </a:endParaRPr>
-          </a:p>
-        </p:txBody>
-      </p:sp>
+            <a:r>
+              <a:rPr b="0" lang="en-US" sz="1800" spc="-1" strike="noStrike">
+                <a:solidFill>
+                  <a:srgbClr val="000000"/>
+                </a:solidFill>
+                <a:uFill>
+                  <a:solidFill>
+                    <a:srgbClr val="ffffff"/>
+                  </a:solidFill>
+                </a:uFill>
+                <a:latin typeface="Arial"/>
+              </a:rPr>
+              <a:t>By Rachel Lininger</a:t>
+            </a:r>
+            <a:endParaRPr b="0" lang="en-US" sz="1800" spc="-1" strike="noStrike">
+              <a:solidFill>
+                <a:srgbClr val="000000"/>
+              </a:solidFill>
+              <a:uFill>
+                <a:solidFill>
+                  <a:srgbClr val="ffffff"/>
+                </a:solidFill>
+              </a:uFill>
+              <a:latin typeface="Arial"/>
+            </a:endParaRPr>
+          </a:p>
+          <a:p>
+            <a:pPr algn="ctr"/>
+            <a:r>
+              <a:rPr b="0" lang="en-US" sz="1800" spc="-1" strike="noStrike">
+                <a:solidFill>
+                  <a:srgbClr val="000000"/>
+                </a:solidFill>
+                <a:uFill>
+                  <a:solidFill>
+                    <a:srgbClr val="ffffff"/>
+                  </a:solidFill>
+                </a:uFill>
+                <a:latin typeface="Arial"/>
+              </a:rPr>
+              <a:t>Presented by Michael Hedges</a:t>
+            </a:r>
+            <a:endParaRPr b="0" lang="en-US" sz="1800" spc="-1" strike="noStrike">
+              <a:solidFill>
+                <a:srgbClr val="000000"/>
+              </a:solidFill>
+              <a:uFill>
+                <a:solidFill>
+                  <a:srgbClr val="ffffff"/>
+                </a:solidFill>
+              </a:uFill>
+              <a:latin typeface="Arial"/>
+            </a:endParaRPr>
+          </a:p>
+        </p:txBody>
+      </p:sp>
+      <p:pic>
+        <p:nvPicPr>
+          <p:cNvPr id="41" name="" descr=""/>
+          <p:cNvPicPr/>
+          <p:nvPr/>
+        </p:nvPicPr>
+        <p:blipFill>
+          <a:blip r:embed="rId1"/>
+          <a:stretch/>
+        </p:blipFill>
+        <p:spPr>
+          <a:xfrm>
+            <a:off x="913320" y="2504880"/>
+            <a:ext cx="8413560" cy="5541840"/>
+          </a:xfrm>
+          <a:prstGeom prst="rect">
+            <a:avLst/>
+          </a:prstGeom>
+          <a:ln>
+            <a:noFill/>
+          </a:ln>
+        </p:spPr>
+      </p:pic>
     </p:spTree>
   </p:cSld>
+  <p:timing>
+    <p:tnLst>
+      <p:par>
+        <p:cTn id="1" dur="indefinite" restart="never" nodeType="tmRoot">
+          <p:childTnLst>
+            <p:seq>
+              <p:cTn id="2" nodeType="mainSeq"/>
+              <p:prevCondLst>
+                <p:cond delay="0" evt="onPrev">
+                  <p:tgtEl>
+                    <p:sldTgt/>
+                  </p:tgtEl>
+                </p:cond>
+              </p:prevCondLst>
+              <p:nextCondLst>
+                <p:cond delay="0" evt="onNext">
+                  <p:tgtEl>
+                    <p:sldTgt/>
+                  </p:tgtEl>
+                </p:cond>
+              </p:nextCondLst>
+            </p:seq>
+          </p:childTnLst>
+        </p:cTn>
+      </p:par>
+    </p:tnLst>
+  </p:timing>
+</p:sld>
+</file>
+
+<file path=ppt/slides/slide2.xml><?xml version="1.0" encoding="utf-8"?>
+<p:sld xmlns:a="http://schemas.openxmlformats.org/drawingml/2006/main" xmlns:p="http://schemas.openxmlformats.org/presentationml/2006/main" xmlns:r="http://schemas.openxmlformats.org/officeDocument/2006/relationships" xmlns:p14="http://schemas.microsoft.com/office/powerpoint/2010/main" xmlns:p15="http://schemas.microsoft.com/office/powerpoint/2012/main" xmlns:mc="http://schemas.openxmlformats.org/markup-compatibility/2006">
+  <p:cSld>
+    <p:spTree>
+      <p:nvGrpSpPr>
+        <p:cNvPr id="1" name=""/>
+        <p:cNvGrpSpPr/>
+        <p:nvPr/>
+      </p:nvGrpSpPr>
+      <p:grpSpPr>
+        <a:xfrm>
+          <a:off x="0" y="0"/>
+          <a:ext cx="0" cy="0"/>
+          <a:chOff x="0" y="0"/>
+          <a:chExt cx="0" cy="0"/>
+        </a:xfrm>
+      </p:grpSpPr>
+    </p:spTree>
+  </p:cSld>
+  <p:timing>
+    <p:tnLst>
+      <p:par>
+        <p:cTn id="3" dur="indefinite" restart="never" nodeType="tmRoot">
+          <p:childTnLst>
+            <p:seq>
+              <p:cTn id="4" nodeType="mainSeq"/>
+              <p:prevCondLst>
+                <p:cond delay="0" evt="onPrev">
+                  <p:tgtEl>
+                    <p:sldTgt/>
+                  </p:tgtEl>
+                </p:cond>
+              </p:prevCondLst>
+              <p:nextCondLst>
+                <p:cond delay="0" evt="onNext">
+                  <p:tgtEl>
+                    <p:sldTgt/>
+                  </p:tgtEl>
+                </p:cond>
+              </p:nextCondLst>
+            </p:seq>
+          </p:childTnLst>
+        </p:cTn>
+      </p:par>
+    </p:tnLst>
+  </p:timing>
 </p:sld>
 </file>
 

</xml_diff>